<commit_message>
Added slide (forgot it)
</commit_message>
<xml_diff>
--- a/Documentatie/Verslagen/PPT.pptx
+++ b/Documentatie/Verslagen/PPT.pptx
@@ -5,20 +5,21 @@
     <p:sldMasterId id="2147483668" r:id="rId1"/>
   </p:sldMasterIdLst>
   <p:notesMasterIdLst>
-    <p:notesMasterId r:id="rId13"/>
+    <p:notesMasterId r:id="rId14"/>
   </p:notesMasterIdLst>
   <p:sldIdLst>
     <p:sldId id="256" r:id="rId2"/>
     <p:sldId id="257" r:id="rId3"/>
-    <p:sldId id="259" r:id="rId4"/>
-    <p:sldId id="260" r:id="rId5"/>
-    <p:sldId id="261" r:id="rId6"/>
-    <p:sldId id="266" r:id="rId7"/>
-    <p:sldId id="262" r:id="rId8"/>
-    <p:sldId id="263" r:id="rId9"/>
-    <p:sldId id="264" r:id="rId10"/>
-    <p:sldId id="265" r:id="rId11"/>
-    <p:sldId id="258" r:id="rId12"/>
+    <p:sldId id="267" r:id="rId4"/>
+    <p:sldId id="259" r:id="rId5"/>
+    <p:sldId id="260" r:id="rId6"/>
+    <p:sldId id="261" r:id="rId7"/>
+    <p:sldId id="266" r:id="rId8"/>
+    <p:sldId id="262" r:id="rId9"/>
+    <p:sldId id="263" r:id="rId10"/>
+    <p:sldId id="264" r:id="rId11"/>
+    <p:sldId id="265" r:id="rId12"/>
+    <p:sldId id="258" r:id="rId13"/>
   </p:sldIdLst>
   <p:sldSz cx="12192000" cy="6858000"/>
   <p:notesSz cx="6858000" cy="9144000"/>
@@ -117,6 +118,11 @@
       </a:defRPr>
     </a:lvl9pPr>
   </p:defaultTextStyle>
+  <p:extLst>
+    <p:ext uri="{EFAFB233-063F-42B5-8137-9DF3F51BA10A}">
+      <p15:sldGuideLst xmlns:p15="http://schemas.microsoft.com/office/powerpoint/2012/main"/>
+    </p:ext>
+  </p:extLst>
 </p:presentation>
 </file>
 
@@ -202,7 +208,7 @@
           <a:p>
             <a:fld id="{60389D3E-CF80-4F13-A68C-12611C87F750}" type="datetimeFigureOut">
               <a:rPr lang="en-GB" smtClean="0"/>
-              <a:t>11/01/2016</a:t>
+              <a:t>12/01/2016</a:t>
             </a:fld>
             <a:endParaRPr lang="en-GB"/>
           </a:p>
@@ -636,7 +642,7 @@
     </p:spTree>
     <p:extLst>
       <p:ext uri="{BB962C8B-B14F-4D97-AF65-F5344CB8AC3E}">
-        <p14:creationId xmlns:p14="http://schemas.microsoft.com/office/powerpoint/2010/main" val="878887477"/>
+        <p14:creationId xmlns:p14="http://schemas.microsoft.com/office/powerpoint/2010/main" val="1258187024"/>
       </p:ext>
     </p:extLst>
   </p:cSld>
@@ -692,7 +698,7 @@
           <a:p>
             <a:r>
               <a:rPr lang="nl-BE" dirty="0" smtClean="0"/>
-              <a:t>Arne </a:t>
+              <a:t>Brecht</a:t>
             </a:r>
             <a:endParaRPr lang="en-GB" dirty="0"/>
           </a:p>
@@ -716,6 +722,94 @@
             <a:fld id="{4AFCBFE3-026C-4ECD-8A1E-E228A6D4CD24}" type="slidenum">
               <a:rPr lang="en-GB" smtClean="0"/>
               <a:t>11</a:t>
+            </a:fld>
+            <a:endParaRPr lang="en-GB"/>
+          </a:p>
+        </p:txBody>
+      </p:sp>
+    </p:spTree>
+    <p:extLst>
+      <p:ext uri="{BB962C8B-B14F-4D97-AF65-F5344CB8AC3E}">
+        <p14:creationId xmlns:p14="http://schemas.microsoft.com/office/powerpoint/2010/main" val="878887477"/>
+      </p:ext>
+    </p:extLst>
+  </p:cSld>
+  <p:clrMapOvr>
+    <a:masterClrMapping/>
+  </p:clrMapOvr>
+</p:notes>
+</file>
+
+<file path=ppt/notesSlides/notesSlide12.xml><?xml version="1.0" encoding="utf-8"?>
+<p:notes xmlns:a="http://schemas.openxmlformats.org/drawingml/2006/main" xmlns:r="http://schemas.openxmlformats.org/officeDocument/2006/relationships" xmlns:p="http://schemas.openxmlformats.org/presentationml/2006/main">
+  <p:cSld>
+    <p:spTree>
+      <p:nvGrpSpPr>
+        <p:cNvPr id="1" name=""/>
+        <p:cNvGrpSpPr/>
+        <p:nvPr/>
+      </p:nvGrpSpPr>
+      <p:grpSpPr>
+        <a:xfrm>
+          <a:off x="0" y="0"/>
+          <a:ext cx="0" cy="0"/>
+          <a:chOff x="0" y="0"/>
+          <a:chExt cx="0" cy="0"/>
+        </a:xfrm>
+      </p:grpSpPr>
+      <p:sp>
+        <p:nvSpPr>
+          <p:cNvPr id="2" name="Tijdelijke aanduiding voor dia-afbeelding 1"/>
+          <p:cNvSpPr>
+            <a:spLocks noGrp="1" noRot="1" noChangeAspect="1"/>
+          </p:cNvSpPr>
+          <p:nvPr>
+            <p:ph type="sldImg"/>
+          </p:nvPr>
+        </p:nvSpPr>
+        <p:spPr/>
+      </p:sp>
+      <p:sp>
+        <p:nvSpPr>
+          <p:cNvPr id="3" name="Tijdelijke aanduiding voor notities 2"/>
+          <p:cNvSpPr>
+            <a:spLocks noGrp="1"/>
+          </p:cNvSpPr>
+          <p:nvPr>
+            <p:ph type="body" idx="1"/>
+          </p:nvPr>
+        </p:nvSpPr>
+        <p:spPr/>
+        <p:txBody>
+          <a:bodyPr/>
+          <a:lstStyle/>
+          <a:p>
+            <a:r>
+              <a:rPr lang="nl-BE" dirty="0" smtClean="0"/>
+              <a:t>Arne </a:t>
+            </a:r>
+            <a:endParaRPr lang="en-GB" dirty="0"/>
+          </a:p>
+        </p:txBody>
+      </p:sp>
+      <p:sp>
+        <p:nvSpPr>
+          <p:cNvPr id="4" name="Tijdelijke aanduiding voor dianummer 3"/>
+          <p:cNvSpPr>
+            <a:spLocks noGrp="1"/>
+          </p:cNvSpPr>
+          <p:nvPr>
+            <p:ph type="sldNum" sz="quarter" idx="10"/>
+          </p:nvPr>
+        </p:nvSpPr>
+        <p:spPr/>
+        <p:txBody>
+          <a:bodyPr/>
+          <a:lstStyle/>
+          <a:p>
+            <a:fld id="{4AFCBFE3-026C-4ECD-8A1E-E228A6D4CD24}" type="slidenum">
+              <a:rPr lang="en-GB" smtClean="0"/>
+              <a:t>12</a:t>
             </a:fld>
             <a:endParaRPr lang="en-GB"/>
           </a:p>
@@ -911,9 +1005,9 @@
           <a:p>
             <a:r>
               <a:rPr lang="nl-BE" dirty="0" smtClean="0"/>
-              <a:t>Arne</a:t>
-            </a:r>
-            <a:endParaRPr lang="en-GB" dirty="0"/>
+              <a:t>Brecht</a:t>
+            </a:r>
+            <a:endParaRPr lang="nl-BE" dirty="0"/>
           </a:p>
         </p:txBody>
       </p:sp>
@@ -943,7 +1037,7 @@
     </p:spTree>
     <p:extLst>
       <p:ext uri="{BB962C8B-B14F-4D97-AF65-F5344CB8AC3E}">
-        <p14:creationId xmlns:p14="http://schemas.microsoft.com/office/powerpoint/2010/main" val="2802489571"/>
+        <p14:creationId xmlns:p14="http://schemas.microsoft.com/office/powerpoint/2010/main" val="336146563"/>
       </p:ext>
     </p:extLst>
   </p:cSld>
@@ -999,7 +1093,7 @@
           <a:p>
             <a:r>
               <a:rPr lang="nl-BE" dirty="0" smtClean="0"/>
-              <a:t>Bart</a:t>
+              <a:t>Arne</a:t>
             </a:r>
             <a:endParaRPr lang="en-GB" dirty="0"/>
           </a:p>
@@ -1031,7 +1125,7 @@
     </p:spTree>
     <p:extLst>
       <p:ext uri="{BB962C8B-B14F-4D97-AF65-F5344CB8AC3E}">
-        <p14:creationId xmlns:p14="http://schemas.microsoft.com/office/powerpoint/2010/main" val="1400690246"/>
+        <p14:creationId xmlns:p14="http://schemas.microsoft.com/office/powerpoint/2010/main" val="2802489571"/>
       </p:ext>
     </p:extLst>
   </p:cSld>
@@ -1087,7 +1181,7 @@
           <a:p>
             <a:r>
               <a:rPr lang="nl-BE" dirty="0" smtClean="0"/>
-              <a:t>Brecht</a:t>
+              <a:t>Bart</a:t>
             </a:r>
             <a:endParaRPr lang="en-GB" dirty="0"/>
           </a:p>
@@ -1119,7 +1213,7 @@
     </p:spTree>
     <p:extLst>
       <p:ext uri="{BB962C8B-B14F-4D97-AF65-F5344CB8AC3E}">
-        <p14:creationId xmlns:p14="http://schemas.microsoft.com/office/powerpoint/2010/main" val="1406916472"/>
+        <p14:creationId xmlns:p14="http://schemas.microsoft.com/office/powerpoint/2010/main" val="1400690246"/>
       </p:ext>
     </p:extLst>
   </p:cSld>
@@ -1175,20 +1269,7 @@
           <a:p>
             <a:r>
               <a:rPr lang="nl-BE" dirty="0" smtClean="0"/>
-              <a:t>Bart</a:t>
-            </a:r>
-          </a:p>
-          <a:p>
-            <a:endParaRPr lang="nl-BE" dirty="0" smtClean="0"/>
-          </a:p>
-          <a:p>
-            <a:r>
-              <a:rPr lang="nl-BE" dirty="0" smtClean="0"/>
-              <a:t>2 boxen van</a:t>
-            </a:r>
-            <a:r>
-              <a:rPr lang="nl-BE" baseline="0" dirty="0" smtClean="0"/>
-              <a:t> 4 ohm in serie =&gt; 8 ohm (Gedoneerd door Nick den Ridder)</a:t>
+              <a:t>Brecht</a:t>
             </a:r>
             <a:endParaRPr lang="en-GB" dirty="0"/>
           </a:p>
@@ -1220,7 +1301,7 @@
     </p:spTree>
     <p:extLst>
       <p:ext uri="{BB962C8B-B14F-4D97-AF65-F5344CB8AC3E}">
-        <p14:creationId xmlns:p14="http://schemas.microsoft.com/office/powerpoint/2010/main" val="1361603491"/>
+        <p14:creationId xmlns:p14="http://schemas.microsoft.com/office/powerpoint/2010/main" val="1406916472"/>
       </p:ext>
     </p:extLst>
   </p:cSld>
@@ -1276,7 +1357,7 @@
           <a:p>
             <a:r>
               <a:rPr lang="nl-BE" dirty="0" smtClean="0"/>
-              <a:t>Stijn</a:t>
+              <a:t>Bart</a:t>
             </a:r>
           </a:p>
           <a:p>
@@ -1285,94 +1366,12 @@
           <a:p>
             <a:r>
               <a:rPr lang="nl-BE" dirty="0" smtClean="0"/>
-              <a:t>Audio </a:t>
-            </a:r>
-            <a:r>
-              <a:rPr lang="nl-BE" dirty="0" err="1" smtClean="0"/>
-              <a:t>library</a:t>
+              <a:t>2 boxen van</a:t>
             </a:r>
             <a:r>
               <a:rPr lang="nl-BE" baseline="0" dirty="0" smtClean="0"/>
-              <a:t> =&gt; </a:t>
-            </a:r>
-            <a:r>
-              <a:rPr lang="nl-BE" baseline="0" dirty="0" err="1" smtClean="0"/>
-              <a:t>Used</a:t>
-            </a:r>
-            <a:r>
-              <a:rPr lang="nl-BE" baseline="0" dirty="0" smtClean="0"/>
-              <a:t> </a:t>
-            </a:r>
-            <a:r>
-              <a:rPr lang="nl-BE" baseline="0" dirty="0" err="1" smtClean="0"/>
-              <a:t>to</a:t>
-            </a:r>
-            <a:r>
-              <a:rPr lang="nl-BE" baseline="0" dirty="0" smtClean="0"/>
-              <a:t> push samples </a:t>
-            </a:r>
-            <a:r>
-              <a:rPr lang="nl-BE" baseline="0" dirty="0" err="1" smtClean="0"/>
-              <a:t>into</a:t>
-            </a:r>
-            <a:r>
-              <a:rPr lang="nl-BE" baseline="0" dirty="0" smtClean="0"/>
-              <a:t> DAC buffer</a:t>
-            </a:r>
-          </a:p>
-          <a:p>
-            <a:r>
-              <a:rPr lang="nl-BE" baseline="0" dirty="0" smtClean="0"/>
-              <a:t>SD </a:t>
-            </a:r>
-            <a:r>
-              <a:rPr lang="nl-BE" baseline="0" dirty="0" err="1" smtClean="0"/>
-              <a:t>library</a:t>
-            </a:r>
-            <a:r>
-              <a:rPr lang="nl-BE" baseline="0" dirty="0" smtClean="0"/>
-              <a:t> =&gt; </a:t>
-            </a:r>
-            <a:r>
-              <a:rPr lang="nl-BE" baseline="0" dirty="0" err="1" smtClean="0"/>
-              <a:t>Used</a:t>
-            </a:r>
-            <a:r>
-              <a:rPr lang="nl-BE" baseline="0" dirty="0" smtClean="0"/>
-              <a:t> </a:t>
-            </a:r>
-            <a:r>
-              <a:rPr lang="nl-BE" baseline="0" dirty="0" err="1" smtClean="0"/>
-              <a:t>for</a:t>
-            </a:r>
-            <a:r>
-              <a:rPr lang="nl-BE" baseline="0" dirty="0" smtClean="0"/>
-              <a:t> </a:t>
-            </a:r>
-            <a:r>
-              <a:rPr lang="nl-BE" baseline="0" dirty="0" err="1" smtClean="0"/>
-              <a:t>communicating</a:t>
-            </a:r>
-            <a:r>
-              <a:rPr lang="nl-BE" baseline="0" dirty="0" smtClean="0"/>
-              <a:t> </a:t>
-            </a:r>
-            <a:r>
-              <a:rPr lang="nl-BE" baseline="0" dirty="0" err="1" smtClean="0"/>
-              <a:t>with</a:t>
-            </a:r>
-            <a:r>
-              <a:rPr lang="nl-BE" baseline="0" dirty="0" smtClean="0"/>
-              <a:t> SD card</a:t>
-            </a:r>
-          </a:p>
-          <a:p>
-            <a:endParaRPr lang="nl-BE" dirty="0" smtClean="0"/>
-          </a:p>
-          <a:p>
-            <a:endParaRPr lang="nl-BE" dirty="0" smtClean="0"/>
-          </a:p>
-          <a:p>
+              <a:t> 4 ohm in serie =&gt; 8 ohm (Gedoneerd door Nick den Ridder)</a:t>
+            </a:r>
             <a:endParaRPr lang="en-GB" dirty="0"/>
           </a:p>
         </p:txBody>
@@ -1403,7 +1402,7 @@
     </p:spTree>
     <p:extLst>
       <p:ext uri="{BB962C8B-B14F-4D97-AF65-F5344CB8AC3E}">
-        <p14:creationId xmlns:p14="http://schemas.microsoft.com/office/powerpoint/2010/main" val="50438842"/>
+        <p14:creationId xmlns:p14="http://schemas.microsoft.com/office/powerpoint/2010/main" val="1361603491"/>
       </p:ext>
     </p:extLst>
   </p:cSld>
@@ -1461,6 +1460,101 @@
               <a:rPr lang="nl-BE" dirty="0" smtClean="0"/>
               <a:t>Stijn</a:t>
             </a:r>
+          </a:p>
+          <a:p>
+            <a:endParaRPr lang="nl-BE" dirty="0" smtClean="0"/>
+          </a:p>
+          <a:p>
+            <a:r>
+              <a:rPr lang="nl-BE" dirty="0" smtClean="0"/>
+              <a:t>Audio </a:t>
+            </a:r>
+            <a:r>
+              <a:rPr lang="nl-BE" dirty="0" err="1" smtClean="0"/>
+              <a:t>library</a:t>
+            </a:r>
+            <a:r>
+              <a:rPr lang="nl-BE" baseline="0" dirty="0" smtClean="0"/>
+              <a:t> =&gt; </a:t>
+            </a:r>
+            <a:r>
+              <a:rPr lang="nl-BE" baseline="0" dirty="0" err="1" smtClean="0"/>
+              <a:t>Used</a:t>
+            </a:r>
+            <a:r>
+              <a:rPr lang="nl-BE" baseline="0" dirty="0" smtClean="0"/>
+              <a:t> </a:t>
+            </a:r>
+            <a:r>
+              <a:rPr lang="nl-BE" baseline="0" dirty="0" err="1" smtClean="0"/>
+              <a:t>to</a:t>
+            </a:r>
+            <a:r>
+              <a:rPr lang="nl-BE" baseline="0" dirty="0" smtClean="0"/>
+              <a:t> push samples </a:t>
+            </a:r>
+            <a:r>
+              <a:rPr lang="nl-BE" baseline="0" dirty="0" err="1" smtClean="0"/>
+              <a:t>into</a:t>
+            </a:r>
+            <a:r>
+              <a:rPr lang="nl-BE" baseline="0" dirty="0" smtClean="0"/>
+              <a:t> DAC buffer</a:t>
+            </a:r>
+          </a:p>
+          <a:p>
+            <a:r>
+              <a:rPr lang="nl-BE" baseline="0" dirty="0" smtClean="0"/>
+              <a:t>SD </a:t>
+            </a:r>
+            <a:r>
+              <a:rPr lang="nl-BE" baseline="0" dirty="0" err="1" smtClean="0"/>
+              <a:t>library</a:t>
+            </a:r>
+            <a:r>
+              <a:rPr lang="nl-BE" baseline="0" dirty="0" smtClean="0"/>
+              <a:t> =&gt; </a:t>
+            </a:r>
+            <a:r>
+              <a:rPr lang="nl-BE" baseline="0" dirty="0" err="1" smtClean="0"/>
+              <a:t>Used</a:t>
+            </a:r>
+            <a:r>
+              <a:rPr lang="nl-BE" baseline="0" dirty="0" smtClean="0"/>
+              <a:t> </a:t>
+            </a:r>
+            <a:r>
+              <a:rPr lang="nl-BE" baseline="0" dirty="0" err="1" smtClean="0"/>
+              <a:t>for</a:t>
+            </a:r>
+            <a:r>
+              <a:rPr lang="nl-BE" baseline="0" dirty="0" smtClean="0"/>
+              <a:t> </a:t>
+            </a:r>
+            <a:r>
+              <a:rPr lang="nl-BE" baseline="0" dirty="0" err="1" smtClean="0"/>
+              <a:t>communicating</a:t>
+            </a:r>
+            <a:r>
+              <a:rPr lang="nl-BE" baseline="0" dirty="0" smtClean="0"/>
+              <a:t> </a:t>
+            </a:r>
+            <a:r>
+              <a:rPr lang="nl-BE" baseline="0" dirty="0" err="1" smtClean="0"/>
+              <a:t>with</a:t>
+            </a:r>
+            <a:r>
+              <a:rPr lang="nl-BE" baseline="0" dirty="0" smtClean="0"/>
+              <a:t> SD card</a:t>
+            </a:r>
+          </a:p>
+          <a:p>
+            <a:endParaRPr lang="nl-BE" dirty="0" smtClean="0"/>
+          </a:p>
+          <a:p>
+            <a:endParaRPr lang="nl-BE" dirty="0" smtClean="0"/>
+          </a:p>
+          <a:p>
             <a:endParaRPr lang="en-GB" dirty="0"/>
           </a:p>
         </p:txBody>
@@ -1491,7 +1585,7 @@
     </p:spTree>
     <p:extLst>
       <p:ext uri="{BB962C8B-B14F-4D97-AF65-F5344CB8AC3E}">
-        <p14:creationId xmlns:p14="http://schemas.microsoft.com/office/powerpoint/2010/main" val="3714331050"/>
+        <p14:creationId xmlns:p14="http://schemas.microsoft.com/office/powerpoint/2010/main" val="50438842"/>
       </p:ext>
     </p:extLst>
   </p:cSld>
@@ -1547,7 +1641,7 @@
           <a:p>
             <a:r>
               <a:rPr lang="nl-BE" dirty="0" smtClean="0"/>
-              <a:t>Brecht</a:t>
+              <a:t>Stijn</a:t>
             </a:r>
             <a:endParaRPr lang="en-GB" dirty="0"/>
           </a:p>
@@ -1579,7 +1673,7 @@
     </p:spTree>
     <p:extLst>
       <p:ext uri="{BB962C8B-B14F-4D97-AF65-F5344CB8AC3E}">
-        <p14:creationId xmlns:p14="http://schemas.microsoft.com/office/powerpoint/2010/main" val="1258187024"/>
+        <p14:creationId xmlns:p14="http://schemas.microsoft.com/office/powerpoint/2010/main" val="3714331050"/>
       </p:ext>
     </p:extLst>
   </p:cSld>
@@ -2092,7 +2186,7 @@
             <a:fld id="{B61BEF0D-F0BB-DE4B-95CE-6DB70DBA9567}" type="datetimeFigureOut">
               <a:rPr lang="en-US" smtClean="0"/>
               <a:pPr/>
-              <a:t>1/11/2016</a:t>
+              <a:t>1/12/2016</a:t>
             </a:fld>
             <a:endParaRPr lang="en-US" dirty="0"/>
           </a:p>
@@ -2390,7 +2484,7 @@
             <a:fld id="{B61BEF0D-F0BB-DE4B-95CE-6DB70DBA9567}" type="datetimeFigureOut">
               <a:rPr lang="en-US" smtClean="0"/>
               <a:pPr/>
-              <a:t>1/11/2016</a:t>
+              <a:t>1/12/2016</a:t>
             </a:fld>
             <a:endParaRPr lang="en-US" dirty="0"/>
           </a:p>
@@ -2640,7 +2734,7 @@
             <a:fld id="{B61BEF0D-F0BB-DE4B-95CE-6DB70DBA9567}" type="datetimeFigureOut">
               <a:rPr lang="en-US" smtClean="0"/>
               <a:pPr/>
-              <a:t>1/11/2016</a:t>
+              <a:t>1/12/2016</a:t>
             </a:fld>
             <a:endParaRPr lang="en-US" dirty="0"/>
           </a:p>
@@ -3182,7 +3276,7 @@
             <a:fld id="{B61BEF0D-F0BB-DE4B-95CE-6DB70DBA9567}" type="datetimeFigureOut">
               <a:rPr lang="en-US" smtClean="0"/>
               <a:pPr/>
-              <a:t>1/11/2016</a:t>
+              <a:t>1/12/2016</a:t>
             </a:fld>
             <a:endParaRPr lang="en-US" dirty="0"/>
           </a:p>
@@ -3432,7 +3526,7 @@
             <a:fld id="{B61BEF0D-F0BB-DE4B-95CE-6DB70DBA9567}" type="datetimeFigureOut">
               <a:rPr lang="en-US" smtClean="0"/>
               <a:pPr/>
-              <a:t>1/11/2016</a:t>
+              <a:t>1/12/2016</a:t>
             </a:fld>
             <a:endParaRPr lang="en-US" dirty="0"/>
           </a:p>
@@ -3966,7 +4060,7 @@
             <a:fld id="{B61BEF0D-F0BB-DE4B-95CE-6DB70DBA9567}" type="datetimeFigureOut">
               <a:rPr lang="en-US" smtClean="0"/>
               <a:pPr/>
-              <a:t>1/11/2016</a:t>
+              <a:t>1/12/2016</a:t>
             </a:fld>
             <a:endParaRPr lang="en-US" dirty="0"/>
           </a:p>
@@ -4265,7 +4359,7 @@
             <a:fld id="{B61BEF0D-F0BB-DE4B-95CE-6DB70DBA9567}" type="datetimeFigureOut">
               <a:rPr lang="en-US" smtClean="0"/>
               <a:pPr/>
-              <a:t>1/11/2016</a:t>
+              <a:t>1/12/2016</a:t>
             </a:fld>
             <a:endParaRPr lang="en-US" dirty="0"/>
           </a:p>
@@ -4441,7 +4535,7 @@
             <a:fld id="{B61BEF0D-F0BB-DE4B-95CE-6DB70DBA9567}" type="datetimeFigureOut">
               <a:rPr lang="en-US" smtClean="0"/>
               <a:pPr/>
-              <a:t>1/11/2016</a:t>
+              <a:t>1/12/2016</a:t>
             </a:fld>
             <a:endParaRPr lang="en-US" dirty="0"/>
           </a:p>
@@ -4623,7 +4717,7 @@
             <a:fld id="{B61BEF0D-F0BB-DE4B-95CE-6DB70DBA9567}" type="datetimeFigureOut">
               <a:rPr lang="en-US" smtClean="0"/>
               <a:pPr/>
-              <a:t>1/11/2016</a:t>
+              <a:t>1/12/2016</a:t>
             </a:fld>
             <a:endParaRPr lang="en-US" dirty="0"/>
           </a:p>
@@ -4795,7 +4889,7 @@
             <a:fld id="{B61BEF0D-F0BB-DE4B-95CE-6DB70DBA9567}" type="datetimeFigureOut">
               <a:rPr lang="en-US" smtClean="0"/>
               <a:pPr/>
-              <a:t>1/11/2016</a:t>
+              <a:t>1/12/2016</a:t>
             </a:fld>
             <a:endParaRPr lang="en-US" dirty="0"/>
           </a:p>
@@ -5048,7 +5142,7 @@
             <a:fld id="{B61BEF0D-F0BB-DE4B-95CE-6DB70DBA9567}" type="datetimeFigureOut">
               <a:rPr lang="en-US" smtClean="0"/>
               <a:pPr/>
-              <a:t>1/11/2016</a:t>
+              <a:t>1/12/2016</a:t>
             </a:fld>
             <a:endParaRPr lang="en-US" dirty="0"/>
           </a:p>
@@ -5347,7 +5441,7 @@
             <a:fld id="{B61BEF0D-F0BB-DE4B-95CE-6DB70DBA9567}" type="datetimeFigureOut">
               <a:rPr lang="en-US" smtClean="0"/>
               <a:pPr/>
-              <a:t>1/11/2016</a:t>
+              <a:t>1/12/2016</a:t>
             </a:fld>
             <a:endParaRPr lang="en-US" dirty="0"/>
           </a:p>
@@ -5791,7 +5885,7 @@
             <a:fld id="{B61BEF0D-F0BB-DE4B-95CE-6DB70DBA9567}" type="datetimeFigureOut">
               <a:rPr lang="en-US" smtClean="0"/>
               <a:pPr/>
-              <a:t>1/11/2016</a:t>
+              <a:t>1/12/2016</a:t>
             </a:fld>
             <a:endParaRPr lang="en-US" dirty="0"/>
           </a:p>
@@ -5911,7 +6005,7 @@
             <a:fld id="{B61BEF0D-F0BB-DE4B-95CE-6DB70DBA9567}" type="datetimeFigureOut">
               <a:rPr lang="en-US" smtClean="0"/>
               <a:pPr/>
-              <a:t>1/11/2016</a:t>
+              <a:t>1/12/2016</a:t>
             </a:fld>
             <a:endParaRPr lang="en-US" dirty="0"/>
           </a:p>
@@ -6008,7 +6102,7 @@
             <a:fld id="{B61BEF0D-F0BB-DE4B-95CE-6DB70DBA9567}" type="datetimeFigureOut">
               <a:rPr lang="en-US" smtClean="0"/>
               <a:pPr/>
-              <a:t>1/11/2016</a:t>
+              <a:t>1/12/2016</a:t>
             </a:fld>
             <a:endParaRPr lang="en-US" dirty="0"/>
           </a:p>
@@ -6293,7 +6387,7 @@
             <a:fld id="{B61BEF0D-F0BB-DE4B-95CE-6DB70DBA9567}" type="datetimeFigureOut">
               <a:rPr lang="en-US" smtClean="0"/>
               <a:pPr/>
-              <a:t>1/11/2016</a:t>
+              <a:t>1/12/2016</a:t>
             </a:fld>
             <a:endParaRPr lang="en-US" dirty="0"/>
           </a:p>
@@ -6586,7 +6680,7 @@
             <a:fld id="{B61BEF0D-F0BB-DE4B-95CE-6DB70DBA9567}" type="datetimeFigureOut">
               <a:rPr lang="en-US" smtClean="0"/>
               <a:pPr/>
-              <a:t>1/11/2016</a:t>
+              <a:t>1/12/2016</a:t>
             </a:fld>
             <a:endParaRPr lang="en-US" dirty="0"/>
           </a:p>
@@ -7118,7 +7212,7 @@
             <a:fld id="{B61BEF0D-F0BB-DE4B-95CE-6DB70DBA9567}" type="datetimeFigureOut">
               <a:rPr lang="en-US" smtClean="0"/>
               <a:pPr/>
-              <a:t>1/11/2016</a:t>
+              <a:t>1/12/2016</a:t>
             </a:fld>
             <a:endParaRPr lang="en-US" dirty="0"/>
           </a:p>
@@ -7758,6 +7852,136 @@
           <a:p>
             <a:r>
               <a:rPr lang="nl-BE" dirty="0" smtClean="0"/>
+              <a:t>Sample Audio</a:t>
+            </a:r>
+            <a:endParaRPr lang="en-GB" dirty="0"/>
+          </a:p>
+        </p:txBody>
+      </p:sp>
+      <p:sp>
+        <p:nvSpPr>
+          <p:cNvPr id="3" name="Tijdelijke aanduiding voor inhoud 2"/>
+          <p:cNvSpPr>
+            <a:spLocks noGrp="1"/>
+          </p:cNvSpPr>
+          <p:nvPr>
+            <p:ph idx="1"/>
+          </p:nvPr>
+        </p:nvSpPr>
+        <p:spPr/>
+        <p:txBody>
+          <a:bodyPr/>
+          <a:lstStyle/>
+          <a:p>
+            <a:r>
+              <a:rPr lang="nl-BE" dirty="0" smtClean="0"/>
+              <a:t>Onverwacht</a:t>
+            </a:r>
+          </a:p>
+          <a:p>
+            <a:r>
+              <a:rPr lang="nl-BE" dirty="0" smtClean="0"/>
+              <a:t>Bibliotheek voor instellen ADC</a:t>
+            </a:r>
+            <a:r>
+              <a:rPr lang="en-GB" dirty="0" smtClean="0"/>
+              <a:t> &amp; DAC</a:t>
+            </a:r>
+          </a:p>
+          <a:p>
+            <a:pPr marL="0" indent="0">
+              <a:buNone/>
+            </a:pPr>
+            <a:endParaRPr lang="nl-BE" dirty="0"/>
+          </a:p>
+          <a:p>
+            <a:r>
+              <a:rPr lang="nl-BE" dirty="0" smtClean="0"/>
+              <a:t>ADC -&gt; 12 bit </a:t>
+            </a:r>
+            <a:r>
+              <a:rPr lang="nl-BE" dirty="0" smtClean="0">
+                <a:sym typeface="Wingdings" panose="05000000000000000000" pitchFamily="2" charset="2"/>
+              </a:rPr>
+              <a:t> (</a:t>
+            </a:r>
+            <a:r>
+              <a:rPr lang="nl-BE" dirty="0" smtClean="0"/>
+              <a:t>minstens </a:t>
+            </a:r>
+            <a:r>
+              <a:rPr lang="nl-BE" dirty="0"/>
+              <a:t>16 bit nodig) </a:t>
+            </a:r>
+            <a:endParaRPr lang="nl-BE" dirty="0" smtClean="0">
+              <a:sym typeface="Wingdings" panose="05000000000000000000" pitchFamily="2" charset="2"/>
+            </a:endParaRPr>
+          </a:p>
+          <a:p>
+            <a:r>
+              <a:rPr lang="nl-BE" dirty="0" smtClean="0">
+                <a:sym typeface="Wingdings" panose="05000000000000000000" pitchFamily="2" charset="2"/>
+              </a:rPr>
+              <a:t>ADC -&gt; geen negatieve waarden </a:t>
+            </a:r>
+            <a:endParaRPr lang="en-GB" dirty="0" smtClean="0"/>
+          </a:p>
+        </p:txBody>
+      </p:sp>
+    </p:spTree>
+    <p:extLst>
+      <p:ext uri="{BB962C8B-B14F-4D97-AF65-F5344CB8AC3E}">
+        <p14:creationId xmlns:p14="http://schemas.microsoft.com/office/powerpoint/2010/main" val="1519483872"/>
+      </p:ext>
+    </p:extLst>
+  </p:cSld>
+  <p:clrMapOvr>
+    <a:masterClrMapping/>
+  </p:clrMapOvr>
+  <p:timing>
+    <p:tnLst>
+      <p:par>
+        <p:cTn id="1" dur="indefinite" restart="never" nodeType="tmRoot"/>
+      </p:par>
+    </p:tnLst>
+  </p:timing>
+</p:sld>
+</file>
+
+<file path=ppt/slides/slide11.xml><?xml version="1.0" encoding="utf-8"?>
+<p:sld xmlns:a="http://schemas.openxmlformats.org/drawingml/2006/main" xmlns:r="http://schemas.openxmlformats.org/officeDocument/2006/relationships" xmlns:p="http://schemas.openxmlformats.org/presentationml/2006/main">
+  <p:cSld>
+    <p:spTree>
+      <p:nvGrpSpPr>
+        <p:cNvPr id="1" name=""/>
+        <p:cNvGrpSpPr/>
+        <p:nvPr/>
+      </p:nvGrpSpPr>
+      <p:grpSpPr>
+        <a:xfrm>
+          <a:off x="0" y="0"/>
+          <a:ext cx="0" cy="0"/>
+          <a:chOff x="0" y="0"/>
+          <a:chExt cx="0" cy="0"/>
+        </a:xfrm>
+      </p:grpSpPr>
+      <p:sp>
+        <p:nvSpPr>
+          <p:cNvPr id="2" name="Titel 1"/>
+          <p:cNvSpPr>
+            <a:spLocks noGrp="1"/>
+          </p:cNvSpPr>
+          <p:nvPr>
+            <p:ph type="title"/>
+          </p:nvPr>
+        </p:nvSpPr>
+        <p:spPr/>
+        <p:txBody>
+          <a:bodyPr/>
+          <a:lstStyle/>
+          <a:p>
+            <a:r>
+              <a:rPr lang="nl-BE" dirty="0" smtClean="0"/>
               <a:t>Delay Audio (Echo)</a:t>
             </a:r>
             <a:endParaRPr lang="en-GB" dirty="0"/>
@@ -7827,7 +8051,7 @@
 </p:sld>
 </file>
 
-<file path=ppt/slides/slide11.xml><?xml version="1.0" encoding="utf-8"?>
+<file path=ppt/slides/slide12.xml><?xml version="1.0" encoding="utf-8"?>
 <p:sld xmlns:a="http://schemas.openxmlformats.org/drawingml/2006/main" xmlns:r="http://schemas.openxmlformats.org/officeDocument/2006/relationships" xmlns:p="http://schemas.openxmlformats.org/presentationml/2006/main">
   <p:cSld>
     <p:spTree>
@@ -8004,8 +8228,13 @@
             </a:r>
             <a:r>
               <a:rPr lang="nl-BE" dirty="0" smtClean="0"/>
-              <a:t> file</a:t>
-            </a:r>
+              <a:t> </a:t>
+            </a:r>
+            <a:r>
+              <a:rPr lang="nl-BE" dirty="0" smtClean="0"/>
+              <a:t>file</a:t>
+            </a:r>
+            <a:endParaRPr lang="nl-BE" dirty="0" smtClean="0"/>
           </a:p>
           <a:p>
             <a:r>
@@ -8112,6 +8341,96 @@
           <a:lstStyle/>
           <a:p>
             <a:r>
+              <a:rPr lang="nl-BE" dirty="0" err="1" smtClean="0"/>
+              <a:t>Nightcore</a:t>
+            </a:r>
+            <a:endParaRPr lang="nl-BE" dirty="0"/>
+          </a:p>
+        </p:txBody>
+      </p:sp>
+      <p:sp>
+        <p:nvSpPr>
+          <p:cNvPr id="3" name="Tijdelijke aanduiding voor inhoud 2"/>
+          <p:cNvSpPr>
+            <a:spLocks noGrp="1"/>
+          </p:cNvSpPr>
+          <p:nvPr>
+            <p:ph idx="1"/>
+          </p:nvPr>
+        </p:nvSpPr>
+        <p:spPr/>
+        <p:txBody>
+          <a:bodyPr/>
+          <a:lstStyle/>
+          <a:p>
+            <a:r>
+              <a:rPr lang="nl-BE" dirty="0" smtClean="0"/>
+              <a:t>Versnellen</a:t>
+            </a:r>
+          </a:p>
+          <a:p>
+            <a:r>
+              <a:rPr lang="nl-BE" dirty="0" smtClean="0"/>
+              <a:t>Sample </a:t>
+            </a:r>
+            <a:r>
+              <a:rPr lang="nl-BE" dirty="0" err="1" smtClean="0"/>
+              <a:t>rate</a:t>
+            </a:r>
+            <a:r>
+              <a:rPr lang="nl-BE" dirty="0" smtClean="0"/>
+              <a:t> aanpassen</a:t>
+            </a:r>
+            <a:endParaRPr lang="nl-BE" dirty="0"/>
+          </a:p>
+        </p:txBody>
+      </p:sp>
+    </p:spTree>
+    <p:extLst>
+      <p:ext uri="{BB962C8B-B14F-4D97-AF65-F5344CB8AC3E}">
+        <p14:creationId xmlns:p14="http://schemas.microsoft.com/office/powerpoint/2010/main" val="190127363"/>
+      </p:ext>
+    </p:extLst>
+  </p:cSld>
+  <p:clrMapOvr>
+    <a:masterClrMapping/>
+  </p:clrMapOvr>
+</p:sld>
+</file>
+
+<file path=ppt/slides/slide4.xml><?xml version="1.0" encoding="utf-8"?>
+<p:sld xmlns:a="http://schemas.openxmlformats.org/drawingml/2006/main" xmlns:r="http://schemas.openxmlformats.org/officeDocument/2006/relationships" xmlns:p="http://schemas.openxmlformats.org/presentationml/2006/main">
+  <p:cSld>
+    <p:spTree>
+      <p:nvGrpSpPr>
+        <p:cNvPr id="1" name=""/>
+        <p:cNvGrpSpPr/>
+        <p:nvPr/>
+      </p:nvGrpSpPr>
+      <p:grpSpPr>
+        <a:xfrm>
+          <a:off x="0" y="0"/>
+          <a:ext cx="0" cy="0"/>
+          <a:chOff x="0" y="0"/>
+          <a:chExt cx="0" cy="0"/>
+        </a:xfrm>
+      </p:grpSpPr>
+      <p:sp>
+        <p:nvSpPr>
+          <p:cNvPr id="2" name="Titel 1"/>
+          <p:cNvSpPr>
+            <a:spLocks noGrp="1"/>
+          </p:cNvSpPr>
+          <p:nvPr>
+            <p:ph type="title"/>
+          </p:nvPr>
+        </p:nvSpPr>
+        <p:spPr/>
+        <p:txBody>
+          <a:bodyPr/>
+          <a:lstStyle/>
+          <a:p>
+            <a:r>
               <a:rPr lang="nl-BE" dirty="0" smtClean="0"/>
               <a:t>Filters</a:t>
             </a:r>
@@ -8201,88 +8520,6 @@
     <p:extLst>
       <p:ext uri="{BB962C8B-B14F-4D97-AF65-F5344CB8AC3E}">
         <p14:creationId xmlns:p14="http://schemas.microsoft.com/office/powerpoint/2010/main" val="558995282"/>
-      </p:ext>
-    </p:extLst>
-  </p:cSld>
-  <p:clrMapOvr>
-    <a:masterClrMapping/>
-  </p:clrMapOvr>
-  <p:timing>
-    <p:tnLst>
-      <p:par>
-        <p:cTn id="1" dur="indefinite" restart="never" nodeType="tmRoot"/>
-      </p:par>
-    </p:tnLst>
-  </p:timing>
-</p:sld>
-</file>
-
-<file path=ppt/slides/slide4.xml><?xml version="1.0" encoding="utf-8"?>
-<p:sld xmlns:a="http://schemas.openxmlformats.org/drawingml/2006/main" xmlns:r="http://schemas.openxmlformats.org/officeDocument/2006/relationships" xmlns:p="http://schemas.openxmlformats.org/presentationml/2006/main">
-  <p:cSld>
-    <p:spTree>
-      <p:nvGrpSpPr>
-        <p:cNvPr id="1" name=""/>
-        <p:cNvGrpSpPr/>
-        <p:nvPr/>
-      </p:nvGrpSpPr>
-      <p:grpSpPr>
-        <a:xfrm>
-          <a:off x="0" y="0"/>
-          <a:ext cx="0" cy="0"/>
-          <a:chOff x="0" y="0"/>
-          <a:chExt cx="0" cy="0"/>
-        </a:xfrm>
-      </p:grpSpPr>
-      <p:sp>
-        <p:nvSpPr>
-          <p:cNvPr id="2" name="Titel 1"/>
-          <p:cNvSpPr>
-            <a:spLocks noGrp="1"/>
-          </p:cNvSpPr>
-          <p:nvPr>
-            <p:ph type="title"/>
-          </p:nvPr>
-        </p:nvSpPr>
-        <p:spPr/>
-        <p:txBody>
-          <a:bodyPr/>
-          <a:lstStyle/>
-          <a:p>
-            <a:r>
-              <a:rPr lang="nl-BE" dirty="0" smtClean="0"/>
-              <a:t>Echo</a:t>
-            </a:r>
-            <a:endParaRPr lang="en-GB" dirty="0"/>
-          </a:p>
-        </p:txBody>
-      </p:sp>
-      <p:sp>
-        <p:nvSpPr>
-          <p:cNvPr id="3" name="Tijdelijke aanduiding voor inhoud 2"/>
-          <p:cNvSpPr>
-            <a:spLocks noGrp="1"/>
-          </p:cNvSpPr>
-          <p:nvPr>
-            <p:ph idx="1"/>
-          </p:nvPr>
-        </p:nvSpPr>
-        <p:spPr/>
-        <p:txBody>
-          <a:bodyPr/>
-          <a:lstStyle/>
-          <a:p>
-            <a:r>
-              <a:rPr lang="nl-BE" dirty="0" smtClean="0"/>
-              <a:t>Principe</a:t>
-            </a:r>
-          </a:p>
-        </p:txBody>
-      </p:sp>
-    </p:spTree>
-    <p:extLst>
-      <p:ext uri="{BB962C8B-B14F-4D97-AF65-F5344CB8AC3E}">
-        <p14:creationId xmlns:p14="http://schemas.microsoft.com/office/powerpoint/2010/main" val="2710357873"/>
       </p:ext>
     </p:extLst>
   </p:cSld>
@@ -8333,7 +8570,7 @@
           <a:p>
             <a:r>
               <a:rPr lang="nl-BE" dirty="0" smtClean="0"/>
-              <a:t>Arduino DUE</a:t>
+              <a:t>Echo</a:t>
             </a:r>
             <a:endParaRPr lang="en-GB" dirty="0"/>
           </a:p>
@@ -8356,35 +8593,22 @@
           <a:p>
             <a:r>
               <a:rPr lang="nl-BE" dirty="0" smtClean="0"/>
-              <a:t>Cortex M3 (DAC,  12 BIT ADC)</a:t>
+              <a:t>Principe</a:t>
             </a:r>
           </a:p>
           <a:p>
             <a:r>
               <a:rPr lang="nl-BE" dirty="0" smtClean="0"/>
-              <a:t>1 MHz </a:t>
-            </a:r>
-            <a:r>
-              <a:rPr lang="nl-BE" dirty="0" err="1" smtClean="0"/>
-              <a:t>clock</a:t>
+              <a:t>Delay</a:t>
             </a:r>
             <a:endParaRPr lang="nl-BE" dirty="0" smtClean="0"/>
-          </a:p>
-          <a:p>
-            <a:r>
-              <a:rPr lang="nl-BE" dirty="0" smtClean="0"/>
-              <a:t>SD Card (SPI)</a:t>
-            </a:r>
-          </a:p>
-          <a:p>
-            <a:endParaRPr lang="en-GB" dirty="0"/>
           </a:p>
         </p:txBody>
       </p:sp>
     </p:spTree>
     <p:extLst>
       <p:ext uri="{BB962C8B-B14F-4D97-AF65-F5344CB8AC3E}">
-        <p14:creationId xmlns:p14="http://schemas.microsoft.com/office/powerpoint/2010/main" val="1086340415"/>
+        <p14:creationId xmlns:p14="http://schemas.microsoft.com/office/powerpoint/2010/main" val="2710357873"/>
       </p:ext>
     </p:extLst>
   </p:cSld>
@@ -8435,59 +8659,58 @@
           <a:p>
             <a:r>
               <a:rPr lang="nl-BE" dirty="0" smtClean="0"/>
-              <a:t>Amplifier</a:t>
+              <a:t>Arduino DUE</a:t>
             </a:r>
             <a:endParaRPr lang="en-GB" dirty="0"/>
           </a:p>
         </p:txBody>
       </p:sp>
-      <p:pic>
-        <p:nvPicPr>
-          <p:cNvPr id="1026" name="Picture 2" descr="schema"/>
-          <p:cNvPicPr>
-            <a:picLocks noGrp="1" noChangeAspect="1" noChangeArrowheads="1"/>
-          </p:cNvPicPr>
+      <p:sp>
+        <p:nvSpPr>
+          <p:cNvPr id="3" name="Tijdelijke aanduiding voor inhoud 2"/>
+          <p:cNvSpPr>
+            <a:spLocks noGrp="1"/>
+          </p:cNvSpPr>
           <p:nvPr>
             <p:ph idx="1"/>
           </p:nvPr>
-        </p:nvPicPr>
-        <p:blipFill>
-          <a:blip r:embed="rId3">
-            <a:extLst>
-              <a:ext uri="{28A0092B-C50C-407E-A947-70E740481C1C}">
-                <a14:useLocalDpi xmlns:a14="http://schemas.microsoft.com/office/drawing/2010/main" val="0"/>
-              </a:ext>
-            </a:extLst>
-          </a:blip>
-          <a:srcRect/>
-          <a:stretch>
-            <a:fillRect/>
-          </a:stretch>
-        </p:blipFill>
-        <p:spPr bwMode="auto">
-          <a:xfrm>
-            <a:off x="4429144" y="2196662"/>
-            <a:ext cx="4093368" cy="4093368"/>
-          </a:xfrm>
-          <a:prstGeom prst="rect">
-            <a:avLst/>
-          </a:prstGeom>
-          <a:noFill/>
-          <a:extLst>
-            <a:ext uri="{909E8E84-426E-40DD-AFC4-6F175D3DCCD1}">
-              <a14:hiddenFill xmlns:a14="http://schemas.microsoft.com/office/drawing/2010/main">
-                <a:solidFill>
-                  <a:srgbClr val="FFFFFF"/>
-                </a:solidFill>
-              </a14:hiddenFill>
-            </a:ext>
-          </a:extLst>
-        </p:spPr>
-      </p:pic>
+        </p:nvSpPr>
+        <p:spPr/>
+        <p:txBody>
+          <a:bodyPr/>
+          <a:lstStyle/>
+          <a:p>
+            <a:r>
+              <a:rPr lang="nl-BE" dirty="0" smtClean="0"/>
+              <a:t>Cortex M3 (DAC,  12 BIT ADC)</a:t>
+            </a:r>
+          </a:p>
+          <a:p>
+            <a:r>
+              <a:rPr lang="nl-BE" dirty="0" smtClean="0"/>
+              <a:t>1 MHz </a:t>
+            </a:r>
+            <a:r>
+              <a:rPr lang="nl-BE" dirty="0" err="1" smtClean="0"/>
+              <a:t>clock</a:t>
+            </a:r>
+            <a:endParaRPr lang="nl-BE" dirty="0" smtClean="0"/>
+          </a:p>
+          <a:p>
+            <a:r>
+              <a:rPr lang="nl-BE" dirty="0" smtClean="0"/>
+              <a:t>SD Card (SPI)</a:t>
+            </a:r>
+          </a:p>
+          <a:p>
+            <a:endParaRPr lang="en-GB" dirty="0"/>
+          </a:p>
+        </p:txBody>
+      </p:sp>
     </p:spTree>
     <p:extLst>
       <p:ext uri="{BB962C8B-B14F-4D97-AF65-F5344CB8AC3E}">
-        <p14:creationId xmlns:p14="http://schemas.microsoft.com/office/powerpoint/2010/main" val="3513150412"/>
+        <p14:creationId xmlns:p14="http://schemas.microsoft.com/office/powerpoint/2010/main" val="1086340415"/>
       </p:ext>
     </p:extLst>
   </p:cSld>
@@ -8538,71 +8761,59 @@
           <a:p>
             <a:r>
               <a:rPr lang="nl-BE" dirty="0" smtClean="0"/>
-              <a:t>Play sound</a:t>
+              <a:t>Amplifier</a:t>
             </a:r>
             <a:endParaRPr lang="en-GB" dirty="0"/>
           </a:p>
         </p:txBody>
       </p:sp>
-      <p:sp>
-        <p:nvSpPr>
-          <p:cNvPr id="3" name="Tijdelijke aanduiding voor inhoud 2"/>
-          <p:cNvSpPr>
-            <a:spLocks noGrp="1"/>
-          </p:cNvSpPr>
+      <p:pic>
+        <p:nvPicPr>
+          <p:cNvPr id="1026" name="Picture 2" descr="schema"/>
+          <p:cNvPicPr>
+            <a:picLocks noGrp="1" noChangeAspect="1" noChangeArrowheads="1"/>
+          </p:cNvPicPr>
           <p:nvPr>
             <p:ph idx="1"/>
           </p:nvPr>
-        </p:nvSpPr>
-        <p:spPr/>
-        <p:txBody>
-          <a:bodyPr/>
-          <a:lstStyle/>
-          <a:p>
-            <a:r>
-              <a:rPr lang="nl-BE" dirty="0" smtClean="0"/>
-              <a:t>Audio </a:t>
-            </a:r>
-            <a:r>
-              <a:rPr lang="nl-BE" dirty="0" err="1" smtClean="0"/>
-              <a:t>library</a:t>
-            </a:r>
-            <a:endParaRPr lang="nl-BE" dirty="0" smtClean="0"/>
-          </a:p>
-          <a:p>
-            <a:r>
-              <a:rPr lang="nl-BE" dirty="0" smtClean="0"/>
-              <a:t>SD </a:t>
-            </a:r>
-            <a:r>
-              <a:rPr lang="nl-BE" dirty="0" err="1" smtClean="0"/>
-              <a:t>library</a:t>
-            </a:r>
-            <a:endParaRPr lang="nl-BE" dirty="0" smtClean="0"/>
-          </a:p>
-          <a:p>
-            <a:r>
-              <a:rPr lang="nl-BE" dirty="0" smtClean="0"/>
-              <a:t>Easy</a:t>
-            </a:r>
-          </a:p>
-          <a:p>
-            <a:r>
-              <a:rPr lang="nl-BE" dirty="0" err="1" smtClean="0"/>
-              <a:t>Wav</a:t>
-            </a:r>
-            <a:r>
-              <a:rPr lang="nl-BE" dirty="0" smtClean="0"/>
-              <a:t> files =&gt; mono</a:t>
-            </a:r>
-            <a:endParaRPr lang="en-GB" dirty="0"/>
-          </a:p>
-        </p:txBody>
-      </p:sp>
+        </p:nvPicPr>
+        <p:blipFill>
+          <a:blip r:embed="rId3">
+            <a:extLst>
+              <a:ext uri="{28A0092B-C50C-407E-A947-70E740481C1C}">
+                <a14:useLocalDpi xmlns:a14="http://schemas.microsoft.com/office/drawing/2010/main" val="0"/>
+              </a:ext>
+            </a:extLst>
+          </a:blip>
+          <a:srcRect/>
+          <a:stretch>
+            <a:fillRect/>
+          </a:stretch>
+        </p:blipFill>
+        <p:spPr bwMode="auto">
+          <a:xfrm>
+            <a:off x="4429144" y="2196662"/>
+            <a:ext cx="4093368" cy="4093368"/>
+          </a:xfrm>
+          <a:prstGeom prst="rect">
+            <a:avLst/>
+          </a:prstGeom>
+          <a:noFill/>
+          <a:extLst>
+            <a:ext uri="{909E8E84-426E-40DD-AFC4-6F175D3DCCD1}">
+              <a14:hiddenFill xmlns:a14="http://schemas.microsoft.com/office/drawing/2010/main">
+                <a:solidFill>
+                  <a:srgbClr val="FFFFFF"/>
+                </a:solidFill>
+              </a14:hiddenFill>
+            </a:ext>
+          </a:extLst>
+        </p:spPr>
+      </p:pic>
     </p:spTree>
     <p:extLst>
       <p:ext uri="{BB962C8B-B14F-4D97-AF65-F5344CB8AC3E}">
-        <p14:creationId xmlns:p14="http://schemas.microsoft.com/office/powerpoint/2010/main" val="180178875"/>
+        <p14:creationId xmlns:p14="http://schemas.microsoft.com/office/powerpoint/2010/main" val="3513150412"/>
       </p:ext>
     </p:extLst>
   </p:cSld>
@@ -8653,49 +8864,62 @@
           <a:p>
             <a:r>
               <a:rPr lang="nl-BE" dirty="0" smtClean="0"/>
-              <a:t>Play </a:t>
+              <a:t>Play sound</a:t>
+            </a:r>
+            <a:endParaRPr lang="en-GB" dirty="0"/>
+          </a:p>
+        </p:txBody>
+      </p:sp>
+      <p:sp>
+        <p:nvSpPr>
+          <p:cNvPr id="3" name="Tijdelijke aanduiding voor inhoud 2"/>
+          <p:cNvSpPr>
+            <a:spLocks noGrp="1"/>
+          </p:cNvSpPr>
+          <p:nvPr>
+            <p:ph idx="1"/>
+          </p:nvPr>
+        </p:nvSpPr>
+        <p:spPr/>
+        <p:txBody>
+          <a:bodyPr/>
+          <a:lstStyle/>
+          <a:p>
+            <a:r>
+              <a:rPr lang="nl-BE" dirty="0" smtClean="0"/>
+              <a:t>Audio </a:t>
             </a:r>
             <a:r>
               <a:rPr lang="nl-BE" dirty="0" err="1" smtClean="0"/>
-              <a:t>Nightcore</a:t>
-            </a:r>
-            <a:endParaRPr lang="en-GB" dirty="0"/>
-          </a:p>
-        </p:txBody>
-      </p:sp>
-      <p:sp>
-        <p:nvSpPr>
-          <p:cNvPr id="3" name="Tijdelijke aanduiding voor inhoud 2"/>
-          <p:cNvSpPr>
-            <a:spLocks noGrp="1"/>
-          </p:cNvSpPr>
-          <p:nvPr>
-            <p:ph idx="1"/>
-          </p:nvPr>
-        </p:nvSpPr>
-        <p:spPr/>
-        <p:txBody>
-          <a:bodyPr/>
-          <a:lstStyle/>
+              <a:t>library</a:t>
+            </a:r>
+            <a:endParaRPr lang="nl-BE" dirty="0" smtClean="0"/>
+          </a:p>
           <a:p>
             <a:r>
               <a:rPr lang="nl-BE" dirty="0" smtClean="0"/>
-              <a:t>Speed up sample </a:t>
+              <a:t>SD </a:t>
             </a:r>
             <a:r>
               <a:rPr lang="nl-BE" dirty="0" err="1" smtClean="0"/>
-              <a:t>rate</a:t>
+              <a:t>library</a:t>
             </a:r>
             <a:endParaRPr lang="nl-BE" dirty="0" smtClean="0"/>
           </a:p>
           <a:p>
             <a:r>
+              <a:rPr lang="nl-BE" dirty="0" smtClean="0"/>
+              <a:t>Easy</a:t>
+            </a:r>
+          </a:p>
+          <a:p>
+            <a:r>
               <a:rPr lang="nl-BE" dirty="0" err="1" smtClean="0"/>
-              <a:t>Audio.begin</a:t>
+              <a:t>Wav</a:t>
             </a:r>
             <a:r>
               <a:rPr lang="nl-BE" dirty="0" smtClean="0"/>
-              <a:t>()</a:t>
+              <a:t> files =&gt; mono</a:t>
             </a:r>
             <a:endParaRPr lang="en-GB" dirty="0"/>
           </a:p>
@@ -8704,7 +8928,7 @@
     </p:spTree>
     <p:extLst>
       <p:ext uri="{BB962C8B-B14F-4D97-AF65-F5344CB8AC3E}">
-        <p14:creationId xmlns:p14="http://schemas.microsoft.com/office/powerpoint/2010/main" val="3886858925"/>
+        <p14:creationId xmlns:p14="http://schemas.microsoft.com/office/powerpoint/2010/main" val="180178875"/>
       </p:ext>
     </p:extLst>
   </p:cSld>
@@ -8755,7 +8979,11 @@
           <a:p>
             <a:r>
               <a:rPr lang="nl-BE" dirty="0" smtClean="0"/>
-              <a:t>Sample Audio</a:t>
+              <a:t>Play </a:t>
+            </a:r>
+            <a:r>
+              <a:rPr lang="nl-BE" dirty="0" err="1" smtClean="0"/>
+              <a:t>Nightcore</a:t>
             </a:r>
             <a:endParaRPr lang="en-GB" dirty="0"/>
           </a:p>
@@ -8778,63 +9006,31 @@
           <a:p>
             <a:r>
               <a:rPr lang="nl-BE" dirty="0" smtClean="0"/>
-              <a:t>Onverwacht</a:t>
-            </a:r>
-          </a:p>
-          <a:p>
+              <a:t>Speed up sample </a:t>
+            </a:r>
+            <a:r>
+              <a:rPr lang="nl-BE" dirty="0" err="1" smtClean="0"/>
+              <a:t>rate</a:t>
+            </a:r>
+            <a:endParaRPr lang="nl-BE" dirty="0" smtClean="0"/>
+          </a:p>
+          <a:p>
+            <a:r>
+              <a:rPr lang="nl-BE" dirty="0" err="1" smtClean="0"/>
+              <a:t>Audio.begin</a:t>
+            </a:r>
             <a:r>
               <a:rPr lang="nl-BE" dirty="0" smtClean="0"/>
-              <a:t>Bibliotheek voor instellen ADC</a:t>
-            </a:r>
-            <a:r>
-              <a:rPr lang="en-GB" dirty="0" smtClean="0"/>
-              <a:t> &amp; DAC</a:t>
-            </a:r>
-          </a:p>
-          <a:p>
-            <a:pPr marL="0" indent="0">
-              <a:buNone/>
-            </a:pPr>
-            <a:endParaRPr lang="nl-BE" dirty="0"/>
-          </a:p>
-          <a:p>
-            <a:r>
-              <a:rPr lang="nl-BE" dirty="0" smtClean="0"/>
-              <a:t>ADC -&gt; 12 bit </a:t>
-            </a:r>
-            <a:r>
-              <a:rPr lang="nl-BE" dirty="0" smtClean="0">
-                <a:sym typeface="Wingdings" panose="05000000000000000000" pitchFamily="2" charset="2"/>
-              </a:rPr>
-              <a:t> (</a:t>
-            </a:r>
-            <a:r>
-              <a:rPr lang="nl-BE" dirty="0" smtClean="0"/>
-              <a:t>minstens </a:t>
-            </a:r>
-            <a:r>
-              <a:rPr lang="nl-BE" dirty="0"/>
-              <a:t>16 bit nodig) </a:t>
-            </a:r>
-            <a:endParaRPr lang="nl-BE" dirty="0" smtClean="0">
-              <a:sym typeface="Wingdings" panose="05000000000000000000" pitchFamily="2" charset="2"/>
-            </a:endParaRPr>
-          </a:p>
-          <a:p>
-            <a:r>
-              <a:rPr lang="nl-BE" dirty="0" smtClean="0">
-                <a:sym typeface="Wingdings" panose="05000000000000000000" pitchFamily="2" charset="2"/>
-              </a:rPr>
-              <a:t>ADC -&gt; geen negatieve waarden </a:t>
-            </a:r>
-            <a:endParaRPr lang="en-GB" dirty="0" smtClean="0"/>
+              <a:t>()</a:t>
+            </a:r>
+            <a:endParaRPr lang="en-GB" dirty="0"/>
           </a:p>
         </p:txBody>
       </p:sp>
     </p:spTree>
     <p:extLst>
       <p:ext uri="{BB962C8B-B14F-4D97-AF65-F5344CB8AC3E}">
-        <p14:creationId xmlns:p14="http://schemas.microsoft.com/office/powerpoint/2010/main" val="1519483872"/>
+        <p14:creationId xmlns:p14="http://schemas.microsoft.com/office/powerpoint/2010/main" val="3886858925"/>
       </p:ext>
     </p:extLst>
   </p:cSld>

</xml_diff>

<commit_message>
Arne does a slide more
</commit_message>
<xml_diff>
--- a/Documentatie/Verslagen/PPT.pptx
+++ b/Documentatie/Verslagen/PPT.pptx
@@ -522,7 +522,11 @@
           <a:p>
             <a:r>
               <a:rPr lang="nl-BE" dirty="0" smtClean="0"/>
-              <a:t>Arne Schoonvliet</a:t>
+              <a:t>Bart </a:t>
+            </a:r>
+            <a:r>
+              <a:rPr lang="nl-BE" dirty="0" err="1" smtClean="0"/>
+              <a:t>Kerstens</a:t>
             </a:r>
             <a:endParaRPr lang="en-GB" dirty="0"/>
           </a:p>
@@ -1005,7 +1009,7 @@
           <a:p>
             <a:r>
               <a:rPr lang="nl-BE" dirty="0" smtClean="0"/>
-              <a:t>Brecht</a:t>
+              <a:t>Arne</a:t>
             </a:r>
             <a:endParaRPr lang="nl-BE" dirty="0"/>
           </a:p>
@@ -8228,13 +8232,8 @@
             </a:r>
             <a:r>
               <a:rPr lang="nl-BE" dirty="0" smtClean="0"/>
-              <a:t> </a:t>
-            </a:r>
-            <a:r>
-              <a:rPr lang="nl-BE" dirty="0" smtClean="0"/>
-              <a:t>file</a:t>
-            </a:r>
-            <a:endParaRPr lang="nl-BE" dirty="0" smtClean="0"/>
+              <a:t> file</a:t>
+            </a:r>
           </a:p>
           <a:p>
             <a:r>
@@ -8601,7 +8600,6 @@
               <a:rPr lang="nl-BE" dirty="0" smtClean="0"/>
               <a:t>Delay</a:t>
             </a:r>
-            <a:endParaRPr lang="nl-BE" dirty="0" smtClean="0"/>
           </a:p>
         </p:txBody>
       </p:sp>

</xml_diff>